<commit_message>
new code quy trinh kho 25-07-2025
</commit_message>
<xml_diff>
--- a/public/images/Kho/QTQLNVL_B10_QDKTNL_2_04042025.pptx
+++ b/public/images/Kho/QTQLNVL_B10_QDKTNL_2_04042025.pptx
@@ -270,7 +270,7 @@
           <a:p>
             <a:fld id="{4C7B19AD-C2EB-4B17-8E96-F3E112D74623}" type="datetimeFigureOut">
               <a:rPr lang="en-US" smtClean="0"/>
-              <a:t>04-04-2025</a:t>
+              <a:t>24-07-2025</a:t>
             </a:fld>
             <a:endParaRPr lang="en-US"/>
           </a:p>
@@ -468,7 +468,7 @@
           <a:p>
             <a:fld id="{4C7B19AD-C2EB-4B17-8E96-F3E112D74623}" type="datetimeFigureOut">
               <a:rPr lang="en-US" smtClean="0"/>
-              <a:t>04-04-2025</a:t>
+              <a:t>24-07-2025</a:t>
             </a:fld>
             <a:endParaRPr lang="en-US"/>
           </a:p>
@@ -676,7 +676,7 @@
           <a:p>
             <a:fld id="{4C7B19AD-C2EB-4B17-8E96-F3E112D74623}" type="datetimeFigureOut">
               <a:rPr lang="en-US" smtClean="0"/>
-              <a:t>04-04-2025</a:t>
+              <a:t>24-07-2025</a:t>
             </a:fld>
             <a:endParaRPr lang="en-US"/>
           </a:p>
@@ -874,7 +874,7 @@
           <a:p>
             <a:fld id="{4C7B19AD-C2EB-4B17-8E96-F3E112D74623}" type="datetimeFigureOut">
               <a:rPr lang="en-US" smtClean="0"/>
-              <a:t>04-04-2025</a:t>
+              <a:t>24-07-2025</a:t>
             </a:fld>
             <a:endParaRPr lang="en-US"/>
           </a:p>
@@ -1149,7 +1149,7 @@
           <a:p>
             <a:fld id="{4C7B19AD-C2EB-4B17-8E96-F3E112D74623}" type="datetimeFigureOut">
               <a:rPr lang="en-US" smtClean="0"/>
-              <a:t>04-04-2025</a:t>
+              <a:t>24-07-2025</a:t>
             </a:fld>
             <a:endParaRPr lang="en-US"/>
           </a:p>
@@ -1414,7 +1414,7 @@
           <a:p>
             <a:fld id="{4C7B19AD-C2EB-4B17-8E96-F3E112D74623}" type="datetimeFigureOut">
               <a:rPr lang="en-US" smtClean="0"/>
-              <a:t>04-04-2025</a:t>
+              <a:t>24-07-2025</a:t>
             </a:fld>
             <a:endParaRPr lang="en-US"/>
           </a:p>
@@ -1826,7 +1826,7 @@
           <a:p>
             <a:fld id="{4C7B19AD-C2EB-4B17-8E96-F3E112D74623}" type="datetimeFigureOut">
               <a:rPr lang="en-US" smtClean="0"/>
-              <a:t>04-04-2025</a:t>
+              <a:t>24-07-2025</a:t>
             </a:fld>
             <a:endParaRPr lang="en-US"/>
           </a:p>
@@ -1967,7 +1967,7 @@
           <a:p>
             <a:fld id="{4C7B19AD-C2EB-4B17-8E96-F3E112D74623}" type="datetimeFigureOut">
               <a:rPr lang="en-US" smtClean="0"/>
-              <a:t>04-04-2025</a:t>
+              <a:t>24-07-2025</a:t>
             </a:fld>
             <a:endParaRPr lang="en-US"/>
           </a:p>
@@ -2080,7 +2080,7 @@
           <a:p>
             <a:fld id="{4C7B19AD-C2EB-4B17-8E96-F3E112D74623}" type="datetimeFigureOut">
               <a:rPr lang="en-US" smtClean="0"/>
-              <a:t>04-04-2025</a:t>
+              <a:t>24-07-2025</a:t>
             </a:fld>
             <a:endParaRPr lang="en-US"/>
           </a:p>
@@ -2391,7 +2391,7 @@
           <a:p>
             <a:fld id="{4C7B19AD-C2EB-4B17-8E96-F3E112D74623}" type="datetimeFigureOut">
               <a:rPr lang="en-US" smtClean="0"/>
-              <a:t>04-04-2025</a:t>
+              <a:t>24-07-2025</a:t>
             </a:fld>
             <a:endParaRPr lang="en-US"/>
           </a:p>
@@ -2679,7 +2679,7 @@
           <a:p>
             <a:fld id="{4C7B19AD-C2EB-4B17-8E96-F3E112D74623}" type="datetimeFigureOut">
               <a:rPr lang="en-US" smtClean="0"/>
-              <a:t>04-04-2025</a:t>
+              <a:t>24-07-2025</a:t>
             </a:fld>
             <a:endParaRPr lang="en-US"/>
           </a:p>
@@ -2920,7 +2920,7 @@
           <a:p>
             <a:fld id="{4C7B19AD-C2EB-4B17-8E96-F3E112D74623}" type="datetimeFigureOut">
               <a:rPr lang="en-US" smtClean="0"/>
-              <a:t>04-04-2025</a:t>
+              <a:t>24-07-2025</a:t>
             </a:fld>
             <a:endParaRPr lang="en-US"/>
           </a:p>
@@ -3525,7 +3525,7 @@
         </p:nvSpPr>
         <p:spPr>
           <a:xfrm>
-            <a:off x="1351263" y="1518361"/>
+            <a:off x="1351263" y="2813761"/>
             <a:ext cx="2688557" cy="338554"/>
           </a:xfrm>
           <a:prstGeom prst="rect">
@@ -3646,7 +3646,7 @@
         </p:nvSpPr>
         <p:spPr>
           <a:xfrm>
-            <a:off x="1351263" y="1988775"/>
+            <a:off x="1351263" y="3284175"/>
             <a:ext cx="3760132" cy="338554"/>
           </a:xfrm>
           <a:prstGeom prst="rect">
@@ -3790,6 +3790,127 @@
               <a:t>.</a:t>
             </a:r>
             <a:endParaRPr lang="en-US" sz="1600" b="1" dirty="0"/>
+          </a:p>
+        </p:txBody>
+      </p:sp>
+      <p:sp>
+        <p:nvSpPr>
+          <p:cNvPr id="2" name="TextBox 1">
+            <a:extLst>
+              <a:ext uri="{FF2B5EF4-FFF2-40B4-BE49-F238E27FC236}">
+                <a16:creationId xmlns:a16="http://schemas.microsoft.com/office/drawing/2014/main" id="{3169F944-E348-4C64-2EF3-A63720242695}"/>
+              </a:ext>
+            </a:extLst>
+          </p:cNvPr>
+          <p:cNvSpPr txBox="1"/>
+          <p:nvPr/>
+        </p:nvSpPr>
+        <p:spPr>
+          <a:xfrm>
+            <a:off x="1618964" y="1518361"/>
+            <a:ext cx="3663567" cy="307777"/>
+          </a:xfrm>
+          <a:prstGeom prst="rect">
+            <a:avLst/>
+          </a:prstGeom>
+          <a:noFill/>
+        </p:spPr>
+        <p:txBody>
+          <a:bodyPr wrap="none" rtlCol="0">
+            <a:spAutoFit/>
+          </a:bodyPr>
+          <a:lstStyle/>
+          <a:p>
+            <a:r>
+              <a:rPr lang="vi-VN" sz="1400" b="1" i="0" dirty="0">
+                <a:solidFill>
+                  <a:srgbClr val="081B3A"/>
+                </a:solidFill>
+                <a:effectLst/>
+                <a:latin typeface="SegoeuiPc"/>
+              </a:rPr>
+              <a:t>2.</a:t>
+            </a:r>
+            <a:r>
+              <a:rPr lang="en-US" sz="1400" b="1" i="0" dirty="0">
+                <a:solidFill>
+                  <a:srgbClr val="081B3A"/>
+                </a:solidFill>
+                <a:effectLst/>
+                <a:latin typeface="SegoeuiPc"/>
+              </a:rPr>
+              <a:t>1.a.</a:t>
+            </a:r>
+            <a:r>
+              <a:rPr lang="vi-VN" sz="1400" b="1" i="0" dirty="0">
+                <a:solidFill>
+                  <a:srgbClr val="081B3A"/>
+                </a:solidFill>
+                <a:effectLst/>
+                <a:latin typeface="SegoeuiPc"/>
+              </a:rPr>
+              <a:t> </a:t>
+            </a:r>
+            <a:r>
+              <a:rPr lang="en-US" sz="1400" b="1" dirty="0"/>
+              <a:t>Quy </a:t>
+            </a:r>
+            <a:r>
+              <a:rPr lang="en-US" sz="1400" b="1" dirty="0" err="1"/>
+              <a:t>trình</a:t>
+            </a:r>
+            <a:r>
+              <a:rPr lang="en-US" sz="1400" b="1" dirty="0"/>
+              <a:t> </a:t>
+            </a:r>
+            <a:r>
+              <a:rPr lang="en-US" sz="1400" b="1" dirty="0" err="1"/>
+              <a:t>hướng</a:t>
+            </a:r>
+            <a:r>
+              <a:rPr lang="en-US" sz="1400" b="1" dirty="0"/>
+              <a:t> </a:t>
+            </a:r>
+            <a:r>
+              <a:rPr lang="en-US" sz="1400" b="1" dirty="0" err="1"/>
+              <a:t>dẫn</a:t>
+            </a:r>
+            <a:r>
+              <a:rPr lang="en-US" sz="1400" b="1" dirty="0"/>
+              <a:t> </a:t>
+            </a:r>
+            <a:r>
+              <a:rPr lang="en-US" sz="1400" b="1" dirty="0" err="1"/>
+              <a:t>kiểm</a:t>
+            </a:r>
+            <a:r>
+              <a:rPr lang="en-US" sz="1400" b="1" dirty="0"/>
+              <a:t> </a:t>
+            </a:r>
+            <a:r>
+              <a:rPr lang="en-US" sz="1400" b="1" dirty="0" err="1"/>
+              <a:t>vải</a:t>
+            </a:r>
+            <a:r>
+              <a:rPr lang="en-US" sz="1400" b="1" dirty="0"/>
+              <a:t> </a:t>
+            </a:r>
+            <a:r>
+              <a:rPr lang="en-US" sz="1400" b="1" dirty="0" err="1"/>
+              <a:t>trên</a:t>
+            </a:r>
+            <a:r>
+              <a:rPr lang="en-US" sz="1400" b="1" dirty="0"/>
+              <a:t> </a:t>
+            </a:r>
+            <a:r>
+              <a:rPr lang="en-US" sz="1400" b="1" dirty="0" err="1"/>
+              <a:t>máy</a:t>
+            </a:r>
+            <a:r>
+              <a:rPr lang="en-US" sz="1400" b="1" dirty="0"/>
+              <a:t>.</a:t>
+            </a:r>
           </a:p>
         </p:txBody>
       </p:sp>

</xml_diff>

<commit_message>
new code quy trinh kho
</commit_message>
<xml_diff>
--- a/public/images/Kho/QTQLNVL_B10_QDKTNL_2_04042025.pptx
+++ b/public/images/Kho/QTQLNVL_B10_QDKTNL_2_04042025.pptx
@@ -270,7 +270,7 @@
           <a:p>
             <a:fld id="{4C7B19AD-C2EB-4B17-8E96-F3E112D74623}" type="datetimeFigureOut">
               <a:rPr lang="en-US" smtClean="0"/>
-              <a:t>24-07-2025</a:t>
+              <a:t>20-11-2025</a:t>
             </a:fld>
             <a:endParaRPr lang="en-US"/>
           </a:p>
@@ -468,7 +468,7 @@
           <a:p>
             <a:fld id="{4C7B19AD-C2EB-4B17-8E96-F3E112D74623}" type="datetimeFigureOut">
               <a:rPr lang="en-US" smtClean="0"/>
-              <a:t>24-07-2025</a:t>
+              <a:t>20-11-2025</a:t>
             </a:fld>
             <a:endParaRPr lang="en-US"/>
           </a:p>
@@ -676,7 +676,7 @@
           <a:p>
             <a:fld id="{4C7B19AD-C2EB-4B17-8E96-F3E112D74623}" type="datetimeFigureOut">
               <a:rPr lang="en-US" smtClean="0"/>
-              <a:t>24-07-2025</a:t>
+              <a:t>20-11-2025</a:t>
             </a:fld>
             <a:endParaRPr lang="en-US"/>
           </a:p>
@@ -874,7 +874,7 @@
           <a:p>
             <a:fld id="{4C7B19AD-C2EB-4B17-8E96-F3E112D74623}" type="datetimeFigureOut">
               <a:rPr lang="en-US" smtClean="0"/>
-              <a:t>24-07-2025</a:t>
+              <a:t>20-11-2025</a:t>
             </a:fld>
             <a:endParaRPr lang="en-US"/>
           </a:p>
@@ -1149,7 +1149,7 @@
           <a:p>
             <a:fld id="{4C7B19AD-C2EB-4B17-8E96-F3E112D74623}" type="datetimeFigureOut">
               <a:rPr lang="en-US" smtClean="0"/>
-              <a:t>24-07-2025</a:t>
+              <a:t>20-11-2025</a:t>
             </a:fld>
             <a:endParaRPr lang="en-US"/>
           </a:p>
@@ -1414,7 +1414,7 @@
           <a:p>
             <a:fld id="{4C7B19AD-C2EB-4B17-8E96-F3E112D74623}" type="datetimeFigureOut">
               <a:rPr lang="en-US" smtClean="0"/>
-              <a:t>24-07-2025</a:t>
+              <a:t>20-11-2025</a:t>
             </a:fld>
             <a:endParaRPr lang="en-US"/>
           </a:p>
@@ -1826,7 +1826,7 @@
           <a:p>
             <a:fld id="{4C7B19AD-C2EB-4B17-8E96-F3E112D74623}" type="datetimeFigureOut">
               <a:rPr lang="en-US" smtClean="0"/>
-              <a:t>24-07-2025</a:t>
+              <a:t>20-11-2025</a:t>
             </a:fld>
             <a:endParaRPr lang="en-US"/>
           </a:p>
@@ -1967,7 +1967,7 @@
           <a:p>
             <a:fld id="{4C7B19AD-C2EB-4B17-8E96-F3E112D74623}" type="datetimeFigureOut">
               <a:rPr lang="en-US" smtClean="0"/>
-              <a:t>24-07-2025</a:t>
+              <a:t>20-11-2025</a:t>
             </a:fld>
             <a:endParaRPr lang="en-US"/>
           </a:p>
@@ -2080,7 +2080,7 @@
           <a:p>
             <a:fld id="{4C7B19AD-C2EB-4B17-8E96-F3E112D74623}" type="datetimeFigureOut">
               <a:rPr lang="en-US" smtClean="0"/>
-              <a:t>24-07-2025</a:t>
+              <a:t>20-11-2025</a:t>
             </a:fld>
             <a:endParaRPr lang="en-US"/>
           </a:p>
@@ -2391,7 +2391,7 @@
           <a:p>
             <a:fld id="{4C7B19AD-C2EB-4B17-8E96-F3E112D74623}" type="datetimeFigureOut">
               <a:rPr lang="en-US" smtClean="0"/>
-              <a:t>24-07-2025</a:t>
+              <a:t>20-11-2025</a:t>
             </a:fld>
             <a:endParaRPr lang="en-US"/>
           </a:p>
@@ -2679,7 +2679,7 @@
           <a:p>
             <a:fld id="{4C7B19AD-C2EB-4B17-8E96-F3E112D74623}" type="datetimeFigureOut">
               <a:rPr lang="en-US" smtClean="0"/>
-              <a:t>24-07-2025</a:t>
+              <a:t>20-11-2025</a:t>
             </a:fld>
             <a:endParaRPr lang="en-US"/>
           </a:p>
@@ -2920,7 +2920,7 @@
           <a:p>
             <a:fld id="{4C7B19AD-C2EB-4B17-8E96-F3E112D74623}" type="datetimeFigureOut">
               <a:rPr lang="en-US" smtClean="0"/>
-              <a:t>24-07-2025</a:t>
+              <a:t>20-11-2025</a:t>
             </a:fld>
             <a:endParaRPr lang="en-US"/>
           </a:p>
@@ -3808,7 +3808,7 @@
         <p:spPr>
           <a:xfrm>
             <a:off x="1618964" y="1518361"/>
-            <a:ext cx="3663567" cy="307777"/>
+            <a:ext cx="4068230" cy="307777"/>
           </a:xfrm>
           <a:prstGeom prst="rect">
             <a:avLst/>
@@ -3852,65 +3852,231 @@
               <a:t> </a:t>
             </a:r>
             <a:r>
-              <a:rPr lang="en-US" sz="1400" b="1" dirty="0"/>
+              <a:rPr lang="en-US" sz="1400" b="1" dirty="0">
+                <a:latin typeface="SegoeuiPc"/>
+              </a:rPr>
               <a:t>Quy </a:t>
             </a:r>
             <a:r>
-              <a:rPr lang="en-US" sz="1400" b="1" dirty="0" err="1"/>
+              <a:rPr lang="en-US" sz="1400" b="1" dirty="0" err="1">
+                <a:latin typeface="SegoeuiPc"/>
+              </a:rPr>
               <a:t>trình</a:t>
             </a:r>
             <a:r>
-              <a:rPr lang="en-US" sz="1400" b="1" dirty="0"/>
+              <a:rPr lang="en-US" sz="1400" b="1" dirty="0">
+                <a:latin typeface="SegoeuiPc"/>
+              </a:rPr>
               <a:t> </a:t>
             </a:r>
             <a:r>
-              <a:rPr lang="en-US" sz="1400" b="1" dirty="0" err="1"/>
+              <a:rPr lang="en-US" sz="1400" b="1" dirty="0" err="1">
+                <a:latin typeface="SegoeuiPc"/>
+              </a:rPr>
               <a:t>hướng</a:t>
             </a:r>
             <a:r>
-              <a:rPr lang="en-US" sz="1400" b="1" dirty="0"/>
+              <a:rPr lang="en-US" sz="1400" b="1" dirty="0">
+                <a:latin typeface="SegoeuiPc"/>
+              </a:rPr>
               <a:t> </a:t>
             </a:r>
             <a:r>
-              <a:rPr lang="en-US" sz="1400" b="1" dirty="0" err="1"/>
+              <a:rPr lang="en-US" sz="1400" b="1" dirty="0" err="1">
+                <a:latin typeface="SegoeuiPc"/>
+              </a:rPr>
               <a:t>dẫn</a:t>
             </a:r>
             <a:r>
-              <a:rPr lang="en-US" sz="1400" b="1" dirty="0"/>
+              <a:rPr lang="en-US" sz="1400" b="1" dirty="0">
+                <a:latin typeface="SegoeuiPc"/>
+              </a:rPr>
               <a:t> </a:t>
             </a:r>
             <a:r>
-              <a:rPr lang="en-US" sz="1400" b="1" dirty="0" err="1"/>
+              <a:rPr lang="en-US" sz="1400" b="1" dirty="0" err="1">
+                <a:latin typeface="SegoeuiPc"/>
+              </a:rPr>
               <a:t>kiểm</a:t>
             </a:r>
             <a:r>
-              <a:rPr lang="en-US" sz="1400" b="1" dirty="0"/>
+              <a:rPr lang="en-US" sz="1400" b="1" dirty="0">
+                <a:latin typeface="SegoeuiPc"/>
+              </a:rPr>
               <a:t> </a:t>
             </a:r>
             <a:r>
-              <a:rPr lang="en-US" sz="1400" b="1" dirty="0" err="1"/>
+              <a:rPr lang="en-US" sz="1400" b="1" dirty="0" err="1">
+                <a:latin typeface="SegoeuiPc"/>
+              </a:rPr>
               <a:t>vải</a:t>
             </a:r>
             <a:r>
-              <a:rPr lang="en-US" sz="1400" b="1" dirty="0"/>
+              <a:rPr lang="en-US" sz="1400" b="1" dirty="0">
+                <a:latin typeface="SegoeuiPc"/>
+              </a:rPr>
               <a:t> </a:t>
             </a:r>
             <a:r>
-              <a:rPr lang="en-US" sz="1400" b="1" dirty="0" err="1"/>
+              <a:rPr lang="en-US" sz="1400" b="1" dirty="0" err="1">
+                <a:latin typeface="SegoeuiPc"/>
+              </a:rPr>
               <a:t>trên</a:t>
             </a:r>
             <a:r>
-              <a:rPr lang="en-US" sz="1400" b="1" dirty="0"/>
+              <a:rPr lang="en-US" sz="1400" b="1" dirty="0">
+                <a:latin typeface="SegoeuiPc"/>
+              </a:rPr>
               <a:t> </a:t>
             </a:r>
             <a:r>
-              <a:rPr lang="en-US" sz="1400" b="1" dirty="0" err="1"/>
+              <a:rPr lang="en-US" sz="1400" b="1" dirty="0" err="1">
+                <a:latin typeface="SegoeuiPc"/>
+              </a:rPr>
               <a:t>máy</a:t>
             </a:r>
             <a:r>
-              <a:rPr lang="en-US" sz="1400" b="1" dirty="0"/>
+              <a:rPr lang="en-US" sz="1400" b="1" dirty="0">
+                <a:latin typeface="SegoeuiPc"/>
+              </a:rPr>
               <a:t>.</a:t>
             </a:r>
+          </a:p>
+        </p:txBody>
+      </p:sp>
+      <p:sp>
+        <p:nvSpPr>
+          <p:cNvPr id="9" name="TextBox 8">
+            <a:extLst>
+              <a:ext uri="{FF2B5EF4-FFF2-40B4-BE49-F238E27FC236}">
+                <a16:creationId xmlns:a16="http://schemas.microsoft.com/office/drawing/2014/main" id="{3169F944-E348-4C64-2EF3-A63720242695}"/>
+              </a:ext>
+            </a:extLst>
+          </p:cNvPr>
+          <p:cNvSpPr txBox="1"/>
+          <p:nvPr/>
+        </p:nvSpPr>
+        <p:spPr>
+          <a:xfrm>
+            <a:off x="1618963" y="1957998"/>
+            <a:ext cx="3515706" cy="307777"/>
+          </a:xfrm>
+          <a:prstGeom prst="rect">
+            <a:avLst/>
+          </a:prstGeom>
+          <a:noFill/>
+        </p:spPr>
+        <p:txBody>
+          <a:bodyPr wrap="none" rtlCol="0">
+            <a:spAutoFit/>
+          </a:bodyPr>
+          <a:lstStyle/>
+          <a:p>
+            <a:r>
+              <a:rPr lang="vi-VN" sz="1400" b="1" i="0" dirty="0">
+                <a:solidFill>
+                  <a:srgbClr val="081B3A"/>
+                </a:solidFill>
+                <a:effectLst/>
+                <a:latin typeface="SegoeuiPc"/>
+              </a:rPr>
+              <a:t>2.</a:t>
+            </a:r>
+            <a:r>
+              <a:rPr lang="en-US" sz="1400" b="1" i="0" dirty="0" smtClean="0">
+                <a:solidFill>
+                  <a:srgbClr val="081B3A"/>
+                </a:solidFill>
+                <a:effectLst/>
+                <a:latin typeface="SegoeuiPc"/>
+              </a:rPr>
+              <a:t>1.b.</a:t>
+            </a:r>
+            <a:r>
+              <a:rPr lang="vi-VN" sz="1400" b="1" i="0" dirty="0" smtClean="0">
+                <a:solidFill>
+                  <a:srgbClr val="081B3A"/>
+                </a:solidFill>
+                <a:effectLst/>
+                <a:latin typeface="SegoeuiPc"/>
+              </a:rPr>
+              <a:t> </a:t>
+            </a:r>
+            <a:r>
+              <a:rPr lang="en-US" sz="1400" b="1" dirty="0">
+                <a:latin typeface="SegoeuiPc"/>
+              </a:rPr>
+              <a:t>Quy </a:t>
+            </a:r>
+            <a:r>
+              <a:rPr lang="en-US" sz="1400" b="1" dirty="0" err="1">
+                <a:latin typeface="SegoeuiPc"/>
+              </a:rPr>
+              <a:t>trình</a:t>
+            </a:r>
+            <a:r>
+              <a:rPr lang="en-US" sz="1400" b="1" dirty="0">
+                <a:latin typeface="SegoeuiPc"/>
+              </a:rPr>
+              <a:t> </a:t>
+            </a:r>
+            <a:r>
+              <a:rPr lang="en-US" sz="1400" b="1" dirty="0" err="1">
+                <a:latin typeface="SegoeuiPc"/>
+              </a:rPr>
+              <a:t>kiểm</a:t>
+            </a:r>
+            <a:r>
+              <a:rPr lang="en-US" sz="1400" b="1" dirty="0">
+                <a:latin typeface="SegoeuiPc"/>
+              </a:rPr>
+              <a:t> </a:t>
+            </a:r>
+            <a:r>
+              <a:rPr lang="en-US" sz="1400" b="1" dirty="0" err="1">
+                <a:latin typeface="SegoeuiPc"/>
+              </a:rPr>
+              <a:t>cây</a:t>
+            </a:r>
+            <a:r>
+              <a:rPr lang="en-US" sz="1400" b="1" dirty="0">
+                <a:latin typeface="SegoeuiPc"/>
+              </a:rPr>
+              <a:t> </a:t>
+            </a:r>
+            <a:r>
+              <a:rPr lang="en-US" sz="1400" b="1" dirty="0" err="1">
+                <a:latin typeface="SegoeuiPc"/>
+              </a:rPr>
+              <a:t>vải</a:t>
+            </a:r>
+            <a:r>
+              <a:rPr lang="en-US" sz="1400" b="1" dirty="0">
+                <a:latin typeface="SegoeuiPc"/>
+              </a:rPr>
+              <a:t> </a:t>
+            </a:r>
+            <a:r>
+              <a:rPr lang="en-US" sz="1400" b="1" dirty="0" err="1">
+                <a:latin typeface="SegoeuiPc"/>
+              </a:rPr>
+              <a:t>dưới</a:t>
+            </a:r>
+            <a:r>
+              <a:rPr lang="en-US" sz="1400" b="1" dirty="0">
+                <a:latin typeface="SegoeuiPc"/>
+              </a:rPr>
+              <a:t> 10m</a:t>
+            </a:r>
+            <a:r>
+              <a:rPr lang="en-US" sz="1400" b="1" dirty="0" smtClean="0">
+                <a:latin typeface="SegoeuiPc"/>
+              </a:rPr>
+              <a:t>.</a:t>
+            </a:r>
+            <a:endParaRPr lang="en-US" sz="1400" b="1" dirty="0">
+              <a:latin typeface="SegoeuiPc"/>
+            </a:endParaRPr>
           </a:p>
         </p:txBody>
       </p:sp>
@@ -3924,6 +4090,13 @@
   <p:clrMapOvr>
     <a:masterClrMapping/>
   </p:clrMapOvr>
+  <p:timing>
+    <p:tnLst>
+      <p:par>
+        <p:cTn id="1" dur="indefinite" restart="never" nodeType="tmRoot"/>
+      </p:par>
+    </p:tnLst>
+  </p:timing>
 </p:sld>
 </file>
 

</xml_diff>